<commit_message>
New version of figure seminar part 2
</commit_message>
<xml_diff>
--- a/Resources/Seminar part 2.pptx
+++ b/Resources/Seminar part 2.pptx
@@ -288,7 +288,7 @@
           <a:p>
             <a:fld id="{F5D328A9-706F-46F5-AEFE-AA92254A4869}" type="datetimeFigureOut">
               <a:rPr lang="de-DE" smtClean="0"/>
-              <a:t>28.11.2018</a:t>
+              <a:t>29.11.2018</a:t>
             </a:fld>
             <a:endParaRPr lang="de-DE"/>
           </a:p>
@@ -465,7 +465,7 @@
           <a:p>
             <a:fld id="{F5D328A9-706F-46F5-AEFE-AA92254A4869}" type="datetimeFigureOut">
               <a:rPr lang="de-DE" smtClean="0"/>
-              <a:t>28.11.2018</a:t>
+              <a:t>29.11.2018</a:t>
             </a:fld>
             <a:endParaRPr lang="de-DE"/>
           </a:p>
@@ -645,7 +645,7 @@
           <a:p>
             <a:fld id="{F5D328A9-706F-46F5-AEFE-AA92254A4869}" type="datetimeFigureOut">
               <a:rPr lang="de-DE" smtClean="0"/>
-              <a:t>28.11.2018</a:t>
+              <a:t>29.11.2018</a:t>
             </a:fld>
             <a:endParaRPr lang="de-DE"/>
           </a:p>
@@ -822,7 +822,7 @@
           <a:p>
             <a:fld id="{F5D328A9-706F-46F5-AEFE-AA92254A4869}" type="datetimeFigureOut">
               <a:rPr lang="de-DE" smtClean="0"/>
-              <a:t>28.11.2018</a:t>
+              <a:t>29.11.2018</a:t>
             </a:fld>
             <a:endParaRPr lang="de-DE"/>
           </a:p>
@@ -1068,7 +1068,7 @@
           <a:p>
             <a:fld id="{F5D328A9-706F-46F5-AEFE-AA92254A4869}" type="datetimeFigureOut">
               <a:rPr lang="de-DE" smtClean="0"/>
-              <a:t>28.11.2018</a:t>
+              <a:t>29.11.2018</a:t>
             </a:fld>
             <a:endParaRPr lang="de-DE"/>
           </a:p>
@@ -1300,7 +1300,7 @@
           <a:p>
             <a:fld id="{F5D328A9-706F-46F5-AEFE-AA92254A4869}" type="datetimeFigureOut">
               <a:rPr lang="de-DE" smtClean="0"/>
-              <a:t>28.11.2018</a:t>
+              <a:t>29.11.2018</a:t>
             </a:fld>
             <a:endParaRPr lang="de-DE"/>
           </a:p>
@@ -1667,7 +1667,7 @@
           <a:p>
             <a:fld id="{F5D328A9-706F-46F5-AEFE-AA92254A4869}" type="datetimeFigureOut">
               <a:rPr lang="de-DE" smtClean="0"/>
-              <a:t>28.11.2018</a:t>
+              <a:t>29.11.2018</a:t>
             </a:fld>
             <a:endParaRPr lang="de-DE"/>
           </a:p>
@@ -1785,7 +1785,7 @@
           <a:p>
             <a:fld id="{F5D328A9-706F-46F5-AEFE-AA92254A4869}" type="datetimeFigureOut">
               <a:rPr lang="de-DE" smtClean="0"/>
-              <a:t>28.11.2018</a:t>
+              <a:t>29.11.2018</a:t>
             </a:fld>
             <a:endParaRPr lang="de-DE"/>
           </a:p>
@@ -1880,7 +1880,7 @@
           <a:p>
             <a:fld id="{F5D328A9-706F-46F5-AEFE-AA92254A4869}" type="datetimeFigureOut">
               <a:rPr lang="de-DE" smtClean="0"/>
-              <a:t>28.11.2018</a:t>
+              <a:t>29.11.2018</a:t>
             </a:fld>
             <a:endParaRPr lang="de-DE"/>
           </a:p>
@@ -2157,7 +2157,7 @@
           <a:p>
             <a:fld id="{F5D328A9-706F-46F5-AEFE-AA92254A4869}" type="datetimeFigureOut">
               <a:rPr lang="de-DE" smtClean="0"/>
-              <a:t>28.11.2018</a:t>
+              <a:t>29.11.2018</a:t>
             </a:fld>
             <a:endParaRPr lang="de-DE"/>
           </a:p>
@@ -2410,7 +2410,7 @@
           <a:p>
             <a:fld id="{F5D328A9-706F-46F5-AEFE-AA92254A4869}" type="datetimeFigureOut">
               <a:rPr lang="de-DE" smtClean="0"/>
-              <a:t>28.11.2018</a:t>
+              <a:t>29.11.2018</a:t>
             </a:fld>
             <a:endParaRPr lang="de-DE"/>
           </a:p>
@@ -2623,7 +2623,7 @@
           <a:p>
             <a:fld id="{F5D328A9-706F-46F5-AEFE-AA92254A4869}" type="datetimeFigureOut">
               <a:rPr lang="de-DE" smtClean="0"/>
-              <a:t>28.11.2018</a:t>
+              <a:t>29.11.2018</a:t>
             </a:fld>
             <a:endParaRPr lang="de-DE"/>
           </a:p>
@@ -3298,7 +3298,6 @@
               <a:rPr lang="de-DE" dirty="0" smtClean="0"/>
               <a:t>Jérôme Hilaire &amp; William Lamb</a:t>
             </a:r>
-            <a:endParaRPr lang="de-DE" dirty="0" smtClean="0"/>
           </a:p>
           <a:p>
             <a:r>
@@ -3543,19 +3542,35 @@
               <a:t> </a:t>
             </a:r>
             <a:r>
-              <a:rPr lang="de-DE" b="1" dirty="0" err="1"/>
+              <a:rPr lang="de-DE" b="1" dirty="0" err="1">
+                <a:solidFill>
+                  <a:srgbClr val="FF0000"/>
+                </a:solidFill>
+              </a:rPr>
               <a:t>vector</a:t>
             </a:r>
             <a:r>
-              <a:rPr lang="de-DE" b="1" dirty="0"/>
+              <a:rPr lang="de-DE" b="1" dirty="0">
+                <a:solidFill>
+                  <a:srgbClr val="FF0000"/>
+                </a:solidFill>
+              </a:rPr>
               <a:t> </a:t>
             </a:r>
             <a:r>
-              <a:rPr lang="de-DE" b="1" dirty="0" err="1"/>
+              <a:rPr lang="de-DE" b="1" dirty="0" err="1">
+                <a:solidFill>
+                  <a:srgbClr val="FF0000"/>
+                </a:solidFill>
+              </a:rPr>
               <a:t>graphics</a:t>
             </a:r>
             <a:r>
-              <a:rPr lang="de-DE" b="1" dirty="0"/>
+              <a:rPr lang="de-DE" b="1" dirty="0">
+                <a:solidFill>
+                  <a:srgbClr val="FF0000"/>
+                </a:solidFill>
+              </a:rPr>
               <a:t> </a:t>
             </a:r>
             <a:r>
@@ -3787,19 +3802,35 @@
               <a:t> </a:t>
             </a:r>
             <a:r>
-              <a:rPr lang="de-DE" b="1" dirty="0" err="1"/>
+              <a:rPr lang="de-DE" b="1" dirty="0" err="1">
+                <a:solidFill>
+                  <a:srgbClr val="FF0000"/>
+                </a:solidFill>
+              </a:rPr>
               <a:t>vector</a:t>
             </a:r>
             <a:r>
-              <a:rPr lang="de-DE" b="1" dirty="0"/>
+              <a:rPr lang="de-DE" b="1" dirty="0">
+                <a:solidFill>
+                  <a:srgbClr val="FF0000"/>
+                </a:solidFill>
+              </a:rPr>
               <a:t> </a:t>
             </a:r>
             <a:r>
-              <a:rPr lang="de-DE" b="1" dirty="0" err="1"/>
+              <a:rPr lang="de-DE" b="1" dirty="0" err="1">
+                <a:solidFill>
+                  <a:srgbClr val="FF0000"/>
+                </a:solidFill>
+              </a:rPr>
               <a:t>graphics</a:t>
             </a:r>
             <a:r>
-              <a:rPr lang="de-DE" b="1" dirty="0"/>
+              <a:rPr lang="de-DE" b="1" dirty="0">
+                <a:solidFill>
+                  <a:srgbClr val="FF0000"/>
+                </a:solidFill>
+              </a:rPr>
               <a:t> </a:t>
             </a:r>
             <a:r>
@@ -4177,11 +4208,7 @@
           <a:p>
             <a:r>
               <a:rPr lang="de-DE" dirty="0" smtClean="0"/>
-              <a:t>        The </a:t>
-            </a:r>
-            <a:r>
-              <a:rPr lang="de-DE" dirty="0" smtClean="0"/>
-              <a:t>7 </a:t>
+              <a:t>        The 7 </a:t>
             </a:r>
             <a:r>
               <a:rPr lang="de-DE" dirty="0" err="1" smtClean="0"/>
@@ -4405,11 +4432,11 @@
             </a:pPr>
             <a:r>
               <a:rPr lang="de-DE" dirty="0" smtClean="0"/>
-              <a:t>Export PNG </a:t>
-            </a:r>
-            <a:r>
-              <a:rPr lang="de-DE" dirty="0" err="1" smtClean="0"/>
-              <a:t>images</a:t>
+              <a:t>Resize </a:t>
+            </a:r>
+            <a:r>
+              <a:rPr lang="de-DE" dirty="0" err="1" smtClean="0"/>
+              <a:t>document</a:t>
             </a:r>
             <a:endParaRPr lang="de-DE" dirty="0" smtClean="0"/>
           </a:p>
@@ -4419,37 +4446,18 @@
               <a:buAutoNum type="arabicPeriod"/>
             </a:pPr>
             <a:r>
-              <a:rPr lang="de-DE" dirty="0" err="1"/>
-              <a:t>Vectorise</a:t>
-            </a:r>
-            <a:r>
-              <a:rPr lang="de-DE" dirty="0"/>
-              <a:t> </a:t>
-            </a:r>
-            <a:r>
-              <a:rPr lang="de-DE" dirty="0" err="1"/>
-              <a:t>pixelated</a:t>
-            </a:r>
-            <a:r>
-              <a:rPr lang="de-DE" dirty="0"/>
-              <a:t> </a:t>
-            </a:r>
-            <a:r>
-              <a:rPr lang="de-DE" dirty="0" err="1"/>
+              <a:rPr lang="de-DE" dirty="0" smtClean="0"/>
+              <a:t>Export </a:t>
+            </a:r>
+            <a:r>
+              <a:rPr lang="de-DE" dirty="0" smtClean="0"/>
+              <a:t>PNG </a:t>
+            </a:r>
+            <a:r>
+              <a:rPr lang="de-DE" dirty="0" err="1" smtClean="0"/>
               <a:t>images</a:t>
             </a:r>
-            <a:r>
-              <a:rPr lang="de-DE" dirty="0"/>
-              <a:t> (</a:t>
-            </a:r>
-            <a:r>
-              <a:rPr lang="de-DE" dirty="0" err="1"/>
-              <a:t>raster</a:t>
-            </a:r>
-            <a:r>
-              <a:rPr lang="de-DE" dirty="0"/>
-              <a:t>)</a:t>
-            </a:r>
+            <a:endParaRPr lang="de-DE" dirty="0" smtClean="0"/>
           </a:p>
           <a:p>
             <a:pPr marL="514350" indent="-514350">
@@ -4458,9 +4466,44 @@
             </a:pPr>
             <a:r>
               <a:rPr lang="de-DE" dirty="0" err="1" smtClean="0"/>
-              <a:t>Layers</a:t>
-            </a:r>
-            <a:endParaRPr lang="de-DE" dirty="0" smtClean="0"/>
+              <a:t>Convert</a:t>
+            </a:r>
+            <a:r>
+              <a:rPr lang="de-DE" dirty="0" smtClean="0"/>
+              <a:t> </a:t>
+            </a:r>
+            <a:r>
+              <a:rPr lang="de-DE" dirty="0" err="1" smtClean="0"/>
+              <a:t>images</a:t>
+            </a:r>
+            <a:r>
+              <a:rPr lang="de-DE" dirty="0" smtClean="0"/>
+              <a:t> </a:t>
+            </a:r>
+            <a:r>
+              <a:rPr lang="de-DE" dirty="0" err="1" smtClean="0"/>
+              <a:t>to</a:t>
+            </a:r>
+            <a:r>
+              <a:rPr lang="de-DE" dirty="0" smtClean="0"/>
+              <a:t> </a:t>
+            </a:r>
+            <a:r>
+              <a:rPr lang="de-DE" dirty="0" err="1" smtClean="0"/>
+              <a:t>vector</a:t>
+            </a:r>
+            <a:r>
+              <a:rPr lang="de-DE" dirty="0" smtClean="0"/>
+              <a:t> </a:t>
+            </a:r>
+            <a:r>
+              <a:rPr lang="de-DE" dirty="0" err="1" smtClean="0"/>
+              <a:t>graphics</a:t>
+            </a:r>
+            <a:r>
+              <a:rPr lang="de-DE" dirty="0" smtClean="0"/>
+              <a:t> </a:t>
+            </a:r>
           </a:p>
           <a:p>
             <a:endParaRPr lang="de-DE" dirty="0"/>
@@ -4562,11 +4605,7 @@
           <a:p>
             <a:r>
               <a:rPr lang="de-DE" dirty="0" smtClean="0"/>
-              <a:t>        The </a:t>
-            </a:r>
-            <a:r>
-              <a:rPr lang="de-DE" dirty="0" smtClean="0"/>
-              <a:t>7 </a:t>
+              <a:t>        The 7 </a:t>
             </a:r>
             <a:r>
               <a:rPr lang="de-DE" dirty="0" err="1" smtClean="0"/>
@@ -4938,11 +4977,11 @@
             </a:pPr>
             <a:r>
               <a:rPr lang="de-DE" dirty="0" smtClean="0"/>
-              <a:t>Export PNG </a:t>
-            </a:r>
-            <a:r>
-              <a:rPr lang="de-DE" dirty="0" err="1" smtClean="0"/>
-              <a:t>image</a:t>
+              <a:t>Resize </a:t>
+            </a:r>
+            <a:r>
+              <a:rPr lang="de-DE" dirty="0" err="1" smtClean="0"/>
+              <a:t>document</a:t>
             </a:r>
             <a:endParaRPr lang="de-DE" dirty="0" smtClean="0"/>
           </a:p>
@@ -4952,37 +4991,18 @@
               <a:buAutoNum type="arabicPeriod"/>
             </a:pPr>
             <a:r>
-              <a:rPr lang="de-DE" dirty="0" err="1" smtClean="0"/>
-              <a:t>Vectorise</a:t>
-            </a:r>
-            <a:r>
-              <a:rPr lang="de-DE" dirty="0" smtClean="0"/>
-              <a:t> </a:t>
-            </a:r>
-            <a:r>
-              <a:rPr lang="de-DE" dirty="0" err="1" smtClean="0"/>
-              <a:t>pixelated</a:t>
-            </a:r>
-            <a:r>
-              <a:rPr lang="de-DE" dirty="0" smtClean="0"/>
-              <a:t> </a:t>
-            </a:r>
-            <a:r>
-              <a:rPr lang="de-DE" dirty="0" err="1" smtClean="0"/>
-              <a:t>images</a:t>
-            </a:r>
-            <a:r>
-              <a:rPr lang="de-DE" dirty="0" smtClean="0"/>
-              <a:t> (</a:t>
-            </a:r>
-            <a:r>
-              <a:rPr lang="de-DE" dirty="0" err="1" smtClean="0"/>
-              <a:t>raster</a:t>
-            </a:r>
-            <a:r>
-              <a:rPr lang="de-DE" dirty="0" smtClean="0"/>
-              <a:t>)</a:t>
-            </a:r>
+              <a:rPr lang="de-DE" dirty="0" smtClean="0"/>
+              <a:t>Export </a:t>
+            </a:r>
+            <a:r>
+              <a:rPr lang="de-DE" dirty="0" smtClean="0"/>
+              <a:t>PNG </a:t>
+            </a:r>
+            <a:r>
+              <a:rPr lang="de-DE" dirty="0" err="1" smtClean="0"/>
+              <a:t>image</a:t>
+            </a:r>
+            <a:endParaRPr lang="de-DE" dirty="0" smtClean="0"/>
           </a:p>
           <a:p>
             <a:pPr marL="514350" indent="-514350">
@@ -4990,13 +5010,42 @@
               <a:buAutoNum type="arabicPeriod"/>
             </a:pPr>
             <a:r>
-              <a:rPr lang="de-DE" dirty="0" err="1" smtClean="0"/>
-              <a:t>Layers</a:t>
+              <a:rPr lang="de-DE" dirty="0" err="1"/>
+              <a:t>Convert</a:t>
+            </a:r>
+            <a:r>
+              <a:rPr lang="de-DE" dirty="0"/>
+              <a:t> </a:t>
+            </a:r>
+            <a:r>
+              <a:rPr lang="de-DE" dirty="0" err="1"/>
+              <a:t>images</a:t>
+            </a:r>
+            <a:r>
+              <a:rPr lang="de-DE" dirty="0"/>
+              <a:t> </a:t>
+            </a:r>
+            <a:r>
+              <a:rPr lang="de-DE" dirty="0" err="1"/>
+              <a:t>to</a:t>
+            </a:r>
+            <a:r>
+              <a:rPr lang="de-DE" dirty="0"/>
+              <a:t> </a:t>
+            </a:r>
+            <a:r>
+              <a:rPr lang="de-DE" dirty="0" err="1"/>
+              <a:t>vector</a:t>
+            </a:r>
+            <a:r>
+              <a:rPr lang="de-DE" dirty="0"/>
+              <a:t> </a:t>
+            </a:r>
+            <a:r>
+              <a:rPr lang="de-DE" dirty="0" err="1"/>
+              <a:t>graphics</a:t>
             </a:r>
             <a:endParaRPr lang="de-DE" dirty="0" smtClean="0"/>
-          </a:p>
-          <a:p>
-            <a:endParaRPr lang="de-DE" dirty="0"/>
           </a:p>
         </p:txBody>
       </p:sp>
@@ -5380,32 +5429,40 @@
               <a:t>2. </a:t>
             </a:r>
             <a:r>
-              <a:rPr lang="de-DE" dirty="0" err="1" smtClean="0"/>
-              <a:t>Vectorise</a:t>
-            </a:r>
-            <a:r>
-              <a:rPr lang="de-DE" dirty="0" smtClean="0"/>
-              <a:t> a </a:t>
-            </a:r>
-            <a:r>
-              <a:rPr lang="de-DE" dirty="0" err="1" smtClean="0"/>
-              <a:t>photo</a:t>
-            </a:r>
-            <a:r>
-              <a:rPr lang="de-DE" dirty="0" smtClean="0"/>
+              <a:rPr lang="de-DE" dirty="0" err="1"/>
+              <a:t>Convert</a:t>
+            </a:r>
+            <a:r>
+              <a:rPr lang="de-DE" dirty="0"/>
               <a:t> </a:t>
             </a:r>
             <a:r>
-              <a:rPr lang="de-DE" dirty="0" err="1" smtClean="0"/>
-              <a:t>or</a:t>
-            </a:r>
-            <a:r>
-              <a:rPr lang="de-DE" dirty="0" smtClean="0"/>
+              <a:rPr lang="de-DE" dirty="0" err="1"/>
+              <a:t>images</a:t>
+            </a:r>
+            <a:r>
+              <a:rPr lang="de-DE" dirty="0"/>
               <a:t> </a:t>
             </a:r>
             <a:r>
-              <a:rPr lang="de-DE" dirty="0" err="1" smtClean="0"/>
-              <a:t>drawing</a:t>
+              <a:rPr lang="de-DE" dirty="0" err="1"/>
+              <a:t>to</a:t>
+            </a:r>
+            <a:r>
+              <a:rPr lang="de-DE" dirty="0"/>
+              <a:t> </a:t>
+            </a:r>
+            <a:r>
+              <a:rPr lang="de-DE" dirty="0" err="1"/>
+              <a:t>vector</a:t>
+            </a:r>
+            <a:r>
+              <a:rPr lang="de-DE" dirty="0"/>
+              <a:t> </a:t>
+            </a:r>
+            <a:r>
+              <a:rPr lang="de-DE" dirty="0" err="1"/>
+              <a:t>graphics</a:t>
             </a:r>
             <a:endParaRPr lang="de-DE" dirty="0"/>
           </a:p>
@@ -5550,7 +5607,9 @@
         </p:nvSpPr>
         <p:spPr/>
         <p:txBody>
-          <a:bodyPr/>
+          <a:bodyPr>
+            <a:normAutofit fontScale="92500" lnSpcReduction="10000"/>
+          </a:bodyPr>
           <a:lstStyle/>
           <a:p>
             <a:r>
@@ -5629,8 +5688,23 @@
           </a:p>
           <a:p>
             <a:r>
+              <a:rPr lang="de-DE" dirty="0">
+                <a:hlinkClick r:id="rId7"/>
+              </a:rPr>
+              <a:t>https://</a:t>
+            </a:r>
+            <a:r>
               <a:rPr lang="de-DE" dirty="0" smtClean="0">
                 <a:hlinkClick r:id="rId7"/>
+              </a:rPr>
+              <a:t>www.youtube.com/playlist?list=PLxtauMB7RON_2tg-mRQTuieFUr29IOKzW</a:t>
+            </a:r>
+            <a:endParaRPr lang="de-DE" dirty="0" smtClean="0"/>
+          </a:p>
+          <a:p>
+            <a:r>
+              <a:rPr lang="de-DE" dirty="0" smtClean="0">
+                <a:hlinkClick r:id="rId8"/>
               </a:rPr>
               <a:t>www.google.com</a:t>
             </a:r>

</xml_diff>